<commit_message>
Changed Booking System Terms.pptx
</commit_message>
<xml_diff>
--- a/Booking System Terms.pptx
+++ b/Booking System Terms.pptx
@@ -609,7 +609,7 @@
           <a:p>
             <a:fld id="{DE9D3E5C-C40F-4E8F-8A30-4676B3E4C94E}" type="datetimeFigureOut">
               <a:rPr lang="en-GB" smtClean="0"/>
-              <a:t>02/11/2021</a:t>
+              <a:t>03/11/2021</a:t>
             </a:fld>
             <a:endParaRPr lang="en-GB" dirty="0"/>
           </a:p>
@@ -1142,7 +1142,7 @@
           <a:p>
             <a:fld id="{E1DAD913-3002-4015-9FB5-D2F7E836993F}" type="datetimeFigureOut">
               <a:rPr lang="en-GB" smtClean="0"/>
-              <a:t>02/11/2021</a:t>
+              <a:t>03/11/2021</a:t>
             </a:fld>
             <a:endParaRPr lang="en-GB" dirty="0"/>
           </a:p>
@@ -1312,7 +1312,7 @@
           <a:p>
             <a:fld id="{E1DAD913-3002-4015-9FB5-D2F7E836993F}" type="datetimeFigureOut">
               <a:rPr lang="en-GB" smtClean="0"/>
-              <a:t>02/11/2021</a:t>
+              <a:t>03/11/2021</a:t>
             </a:fld>
             <a:endParaRPr lang="en-GB" dirty="0"/>
           </a:p>
@@ -1492,7 +1492,7 @@
           <a:p>
             <a:fld id="{E1DAD913-3002-4015-9FB5-D2F7E836993F}" type="datetimeFigureOut">
               <a:rPr lang="en-GB" smtClean="0"/>
-              <a:t>02/11/2021</a:t>
+              <a:t>03/11/2021</a:t>
             </a:fld>
             <a:endParaRPr lang="en-GB" dirty="0"/>
           </a:p>
@@ -1610,7 +1610,7 @@
           <a:p>
             <a:fld id="{E1DAD913-3002-4015-9FB5-D2F7E836993F}" type="datetimeFigureOut">
               <a:rPr lang="en-GB" smtClean="0"/>
-              <a:t>02/11/2021</a:t>
+              <a:t>03/11/2021</a:t>
             </a:fld>
             <a:endParaRPr lang="en-GB" dirty="0"/>
           </a:p>
@@ -1780,7 +1780,7 @@
           <a:p>
             <a:fld id="{E1DAD913-3002-4015-9FB5-D2F7E836993F}" type="datetimeFigureOut">
               <a:rPr lang="en-GB" smtClean="0"/>
-              <a:t>02/11/2021</a:t>
+              <a:t>03/11/2021</a:t>
             </a:fld>
             <a:endParaRPr lang="en-GB" dirty="0"/>
           </a:p>
@@ -2062,7 +2062,7 @@
           <a:p>
             <a:fld id="{E1DAD913-3002-4015-9FB5-D2F7E836993F}" type="datetimeFigureOut">
               <a:rPr lang="en-GB" smtClean="0"/>
-              <a:t>02/11/2021</a:t>
+              <a:t>03/11/2021</a:t>
             </a:fld>
             <a:endParaRPr lang="en-GB" dirty="0"/>
           </a:p>
@@ -2350,7 +2350,7 @@
           <a:p>
             <a:fld id="{E1DAD913-3002-4015-9FB5-D2F7E836993F}" type="datetimeFigureOut">
               <a:rPr lang="en-GB" smtClean="0"/>
-              <a:t>02/11/2021</a:t>
+              <a:t>03/11/2021</a:t>
             </a:fld>
             <a:endParaRPr lang="en-GB" dirty="0"/>
           </a:p>
@@ -2772,7 +2772,7 @@
           <a:p>
             <a:fld id="{E1DAD913-3002-4015-9FB5-D2F7E836993F}" type="datetimeFigureOut">
               <a:rPr lang="en-GB" smtClean="0"/>
-              <a:t>02/11/2021</a:t>
+              <a:t>03/11/2021</a:t>
             </a:fld>
             <a:endParaRPr lang="en-GB" dirty="0"/>
           </a:p>
@@ -2890,7 +2890,7 @@
           <a:p>
             <a:fld id="{E1DAD913-3002-4015-9FB5-D2F7E836993F}" type="datetimeFigureOut">
               <a:rPr lang="en-GB" smtClean="0"/>
-              <a:t>02/11/2021</a:t>
+              <a:t>03/11/2021</a:t>
             </a:fld>
             <a:endParaRPr lang="en-GB" dirty="0"/>
           </a:p>
@@ -2985,7 +2985,7 @@
           <a:p>
             <a:fld id="{E1DAD913-3002-4015-9FB5-D2F7E836993F}" type="datetimeFigureOut">
               <a:rPr lang="en-GB" smtClean="0"/>
-              <a:t>02/11/2021</a:t>
+              <a:t>03/11/2021</a:t>
             </a:fld>
             <a:endParaRPr lang="en-GB" dirty="0"/>
           </a:p>
@@ -3262,7 +3262,7 @@
           <a:p>
             <a:fld id="{E1DAD913-3002-4015-9FB5-D2F7E836993F}" type="datetimeFigureOut">
               <a:rPr lang="en-GB" smtClean="0"/>
-              <a:t>02/11/2021</a:t>
+              <a:t>03/11/2021</a:t>
             </a:fld>
             <a:endParaRPr lang="en-GB" dirty="0"/>
           </a:p>
@@ -3515,7 +3515,7 @@
           <a:p>
             <a:fld id="{E1DAD913-3002-4015-9FB5-D2F7E836993F}" type="datetimeFigureOut">
               <a:rPr lang="en-GB" smtClean="0"/>
-              <a:t>02/11/2021</a:t>
+              <a:t>03/11/2021</a:t>
             </a:fld>
             <a:endParaRPr lang="en-GB" dirty="0"/>
           </a:p>
@@ -3728,7 +3728,7 @@
           <a:p>
             <a:fld id="{E1DAD913-3002-4015-9FB5-D2F7E836993F}" type="datetimeFigureOut">
               <a:rPr lang="en-GB" smtClean="0"/>
-              <a:t>02/11/2021</a:t>
+              <a:t>03/11/2021</a:t>
             </a:fld>
             <a:endParaRPr lang="en-GB" dirty="0"/>
           </a:p>
@@ -4577,8 +4577,15 @@
           <a:p>
             <a:r>
               <a:rPr lang="en-GB" dirty="0"/>
-              <a:t>Users must not allow third party to use their account to access the booking system</a:t>
-            </a:r>
+              <a:t>Users must not allow third party to use their account to access the </a:t>
+            </a:r>
+            <a:r>
+              <a:rPr lang="en-GB"/>
+              <a:t>booking system</a:t>
+            </a:r>
+          </a:p>
+          <a:p>
+            <a:endParaRPr lang="en-GB" dirty="0"/>
           </a:p>
         </p:txBody>
       </p:sp>

</xml_diff>

<commit_message>
Added license to the terms
</commit_message>
<xml_diff>
--- a/Booking System Terms.pptx
+++ b/Booking System Terms.pptx
@@ -138,7 +138,6 @@
 <p1510:revInfo xmlns:a="http://schemas.openxmlformats.org/drawingml/2006/main" xmlns:r="http://schemas.openxmlformats.org/officeDocument/2006/relationships" xmlns:p1510="http://schemas.microsoft.com/office/powerpoint/2015/10/main">
   <p1510:revLst>
     <p1510:client id="{135EC2BA-6533-4818-B07B-F53401C1E82E}" v="63" dt="2021-10-29T09:59:06.914"/>
-    <p1510:client id="{20F081F3-818F-0DDB-4C32-74C2A5D07321}" v="86" dt="2021-11-02T12:39:58.267"/>
   </p1510:revLst>
 </p1510:revInfo>
 </file>
@@ -146,9 +145,93 @@
 <file path=ppt/changesInfos/changesInfo1.xml><?xml version="1.0" encoding="utf-8"?>
 <pc:chgInfo xmlns:a="http://schemas.openxmlformats.org/drawingml/2006/main" xmlns:r="http://schemas.openxmlformats.org/officeDocument/2006/relationships" xmlns:ac="http://schemas.microsoft.com/office/drawing/2013/main/command" xmlns:pc="http://schemas.microsoft.com/office/powerpoint/2013/main/command">
   <pc:docChgLst>
+    <pc:chgData name="Mutasa T R R T (FCES)" userId="S::30004825@students.southwales.ac.uk::e10a28fd-ae22-4d0d-acae-6a3382516f36" providerId="AD" clId="Web-{20F081F3-818F-0DDB-4C32-74C2A5D07321}"/>
+    <pc:docChg chg="addSld delSld modSld">
+      <pc:chgData name="Mutasa T R R T (FCES)" userId="S::30004825@students.southwales.ac.uk::e10a28fd-ae22-4d0d-acae-6a3382516f36" providerId="AD" clId="Web-{20F081F3-818F-0DDB-4C32-74C2A5D07321}" dt="2021-11-02T12:39:58.267" v="83"/>
+      <pc:docMkLst>
+        <pc:docMk/>
+      </pc:docMkLst>
+      <pc:sldChg chg="modSp">
+        <pc:chgData name="Mutasa T R R T (FCES)" userId="S::30004825@students.southwales.ac.uk::e10a28fd-ae22-4d0d-acae-6a3382516f36" providerId="AD" clId="Web-{20F081F3-818F-0DDB-4C32-74C2A5D07321}" dt="2021-11-02T12:35:30.385" v="12" actId="20577"/>
+        <pc:sldMkLst>
+          <pc:docMk/>
+          <pc:sldMk cId="1871673063" sldId="309"/>
+        </pc:sldMkLst>
+        <pc:spChg chg="mod">
+          <ac:chgData name="Mutasa T R R T (FCES)" userId="S::30004825@students.southwales.ac.uk::e10a28fd-ae22-4d0d-acae-6a3382516f36" providerId="AD" clId="Web-{20F081F3-818F-0DDB-4C32-74C2A5D07321}" dt="2021-11-02T12:35:30.385" v="12" actId="20577"/>
+          <ac:spMkLst>
+            <pc:docMk/>
+            <pc:sldMk cId="1871673063" sldId="309"/>
+            <ac:spMk id="2" creationId="{00000000-0000-0000-0000-000000000000}"/>
+          </ac:spMkLst>
+        </pc:spChg>
+      </pc:sldChg>
+      <pc:sldChg chg="modSp">
+        <pc:chgData name="Mutasa T R R T (FCES)" userId="S::30004825@students.southwales.ac.uk::e10a28fd-ae22-4d0d-acae-6a3382516f36" providerId="AD" clId="Web-{20F081F3-818F-0DDB-4C32-74C2A5D07321}" dt="2021-11-02T12:34:18.274" v="3" actId="20577"/>
+        <pc:sldMkLst>
+          <pc:docMk/>
+          <pc:sldMk cId="3066015917" sldId="325"/>
+        </pc:sldMkLst>
+        <pc:spChg chg="mod">
+          <ac:chgData name="Mutasa T R R T (FCES)" userId="S::30004825@students.southwales.ac.uk::e10a28fd-ae22-4d0d-acae-6a3382516f36" providerId="AD" clId="Web-{20F081F3-818F-0DDB-4C32-74C2A5D07321}" dt="2021-11-02T12:34:18.274" v="3" actId="20577"/>
+          <ac:spMkLst>
+            <pc:docMk/>
+            <pc:sldMk cId="3066015917" sldId="325"/>
+            <ac:spMk id="2" creationId="{00000000-0000-0000-0000-000000000000}"/>
+          </ac:spMkLst>
+        </pc:spChg>
+      </pc:sldChg>
+      <pc:sldChg chg="modSp">
+        <pc:chgData name="Mutasa T R R T (FCES)" userId="S::30004825@students.southwales.ac.uk::e10a28fd-ae22-4d0d-acae-6a3382516f36" providerId="AD" clId="Web-{20F081F3-818F-0DDB-4C32-74C2A5D07321}" dt="2021-11-02T12:33:49.945" v="1" actId="20577"/>
+        <pc:sldMkLst>
+          <pc:docMk/>
+          <pc:sldMk cId="1502871932" sldId="327"/>
+        </pc:sldMkLst>
+        <pc:spChg chg="mod">
+          <ac:chgData name="Mutasa T R R T (FCES)" userId="S::30004825@students.southwales.ac.uk::e10a28fd-ae22-4d0d-acae-6a3382516f36" providerId="AD" clId="Web-{20F081F3-818F-0DDB-4C32-74C2A5D07321}" dt="2021-11-02T12:33:49.945" v="1" actId="20577"/>
+          <ac:spMkLst>
+            <pc:docMk/>
+            <pc:sldMk cId="1502871932" sldId="327"/>
+            <ac:spMk id="3" creationId="{00000000-0000-0000-0000-000000000000}"/>
+          </ac:spMkLst>
+        </pc:spChg>
+      </pc:sldChg>
+      <pc:sldChg chg="modSp new">
+        <pc:chgData name="Mutasa T R R T (FCES)" userId="S::30004825@students.southwales.ac.uk::e10a28fd-ae22-4d0d-acae-6a3382516f36" providerId="AD" clId="Web-{20F081F3-818F-0DDB-4C32-74C2A5D07321}" dt="2021-11-02T12:39:09.281" v="82" actId="20577"/>
+        <pc:sldMkLst>
+          <pc:docMk/>
+          <pc:sldMk cId="270185241" sldId="329"/>
+        </pc:sldMkLst>
+        <pc:spChg chg="mod">
+          <ac:chgData name="Mutasa T R R T (FCES)" userId="S::30004825@students.southwales.ac.uk::e10a28fd-ae22-4d0d-acae-6a3382516f36" providerId="AD" clId="Web-{20F081F3-818F-0DDB-4C32-74C2A5D07321}" dt="2021-11-02T12:36:36.230" v="17" actId="20577"/>
+          <ac:spMkLst>
+            <pc:docMk/>
+            <pc:sldMk cId="270185241" sldId="329"/>
+            <ac:spMk id="2" creationId="{57FF02FF-A8C5-485C-94EB-3E1DAAFD110F}"/>
+          </ac:spMkLst>
+        </pc:spChg>
+        <pc:spChg chg="mod">
+          <ac:chgData name="Mutasa T R R T (FCES)" userId="S::30004825@students.southwales.ac.uk::e10a28fd-ae22-4d0d-acae-6a3382516f36" providerId="AD" clId="Web-{20F081F3-818F-0DDB-4C32-74C2A5D07321}" dt="2021-11-02T12:39:09.281" v="82" actId="20577"/>
+          <ac:spMkLst>
+            <pc:docMk/>
+            <pc:sldMk cId="270185241" sldId="329"/>
+            <ac:spMk id="3" creationId="{36735DBE-B554-4477-A0A8-F436D956AEA1}"/>
+          </ac:spMkLst>
+        </pc:spChg>
+      </pc:sldChg>
+      <pc:sldChg chg="new del">
+        <pc:chgData name="Mutasa T R R T (FCES)" userId="S::30004825@students.southwales.ac.uk::e10a28fd-ae22-4d0d-acae-6a3382516f36" providerId="AD" clId="Web-{20F081F3-818F-0DDB-4C32-74C2A5D07321}" dt="2021-11-02T12:39:58.267" v="83"/>
+        <pc:sldMkLst>
+          <pc:docMk/>
+          <pc:sldMk cId="3738298503" sldId="330"/>
+        </pc:sldMkLst>
+      </pc:sldChg>
+    </pc:docChg>
+  </pc:docChgLst>
+  <pc:docChgLst>
     <pc:chgData name="Almutairi T A O H (FCES)" userId="8fbd8949-7e48-4210-b6f0-d83fe02d77c3" providerId="ADAL" clId="{135EC2BA-6533-4818-B07B-F53401C1E82E}"/>
     <pc:docChg chg="undo custSel addSld delSld modSld">
-      <pc:chgData name="Almutairi T A O H (FCES)" userId="8fbd8949-7e48-4210-b6f0-d83fe02d77c3" providerId="ADAL" clId="{135EC2BA-6533-4818-B07B-F53401C1E82E}" dt="2021-10-29T10:11:17.216" v="2871" actId="20577"/>
+      <pc:chgData name="Almutairi T A O H (FCES)" userId="8fbd8949-7e48-4210-b6f0-d83fe02d77c3" providerId="ADAL" clId="{135EC2BA-6533-4818-B07B-F53401C1E82E}" dt="2021-11-05T10:22:49.803" v="3976" actId="27636"/>
       <pc:docMkLst>
         <pc:docMk/>
       </pc:docMkLst>
@@ -424,6 +507,21 @@
           </ac:spMkLst>
         </pc:spChg>
       </pc:sldChg>
+      <pc:sldChg chg="modSp mod">
+        <pc:chgData name="Almutairi T A O H (FCES)" userId="8fbd8949-7e48-4210-b6f0-d83fe02d77c3" providerId="ADAL" clId="{135EC2BA-6533-4818-B07B-F53401C1E82E}" dt="2021-11-05T10:22:49.803" v="3976" actId="27636"/>
+        <pc:sldMkLst>
+          <pc:docMk/>
+          <pc:sldMk cId="270185241" sldId="329"/>
+        </pc:sldMkLst>
+        <pc:spChg chg="mod">
+          <ac:chgData name="Almutairi T A O H (FCES)" userId="8fbd8949-7e48-4210-b6f0-d83fe02d77c3" providerId="ADAL" clId="{135EC2BA-6533-4818-B07B-F53401C1E82E}" dt="2021-11-05T10:22:49.803" v="3976" actId="27636"/>
+          <ac:spMkLst>
+            <pc:docMk/>
+            <pc:sldMk cId="270185241" sldId="329"/>
+            <ac:spMk id="3" creationId="{36735DBE-B554-4477-A0A8-F436D956AEA1}"/>
+          </ac:spMkLst>
+        </pc:spChg>
+      </pc:sldChg>
       <pc:sldChg chg="del">
         <pc:chgData name="Almutairi T A O H (FCES)" userId="8fbd8949-7e48-4210-b6f0-d83fe02d77c3" providerId="ADAL" clId="{135EC2BA-6533-4818-B07B-F53401C1E82E}" dt="2021-10-29T09:43:50.428" v="135" actId="47"/>
         <pc:sldMkLst>
@@ -436,90 +534,6 @@
         <pc:sldMkLst>
           <pc:docMk/>
           <pc:sldMk cId="3374164030" sldId="330"/>
-        </pc:sldMkLst>
-      </pc:sldChg>
-    </pc:docChg>
-  </pc:docChgLst>
-  <pc:docChgLst>
-    <pc:chgData name="Mutasa T R R T (FCES)" userId="S::30004825@students.southwales.ac.uk::e10a28fd-ae22-4d0d-acae-6a3382516f36" providerId="AD" clId="Web-{20F081F3-818F-0DDB-4C32-74C2A5D07321}"/>
-    <pc:docChg chg="addSld delSld modSld">
-      <pc:chgData name="Mutasa T R R T (FCES)" userId="S::30004825@students.southwales.ac.uk::e10a28fd-ae22-4d0d-acae-6a3382516f36" providerId="AD" clId="Web-{20F081F3-818F-0DDB-4C32-74C2A5D07321}" dt="2021-11-02T12:39:58.267" v="83"/>
-      <pc:docMkLst>
-        <pc:docMk/>
-      </pc:docMkLst>
-      <pc:sldChg chg="modSp">
-        <pc:chgData name="Mutasa T R R T (FCES)" userId="S::30004825@students.southwales.ac.uk::e10a28fd-ae22-4d0d-acae-6a3382516f36" providerId="AD" clId="Web-{20F081F3-818F-0DDB-4C32-74C2A5D07321}" dt="2021-11-02T12:35:30.385" v="12" actId="20577"/>
-        <pc:sldMkLst>
-          <pc:docMk/>
-          <pc:sldMk cId="1871673063" sldId="309"/>
-        </pc:sldMkLst>
-        <pc:spChg chg="mod">
-          <ac:chgData name="Mutasa T R R T (FCES)" userId="S::30004825@students.southwales.ac.uk::e10a28fd-ae22-4d0d-acae-6a3382516f36" providerId="AD" clId="Web-{20F081F3-818F-0DDB-4C32-74C2A5D07321}" dt="2021-11-02T12:35:30.385" v="12" actId="20577"/>
-          <ac:spMkLst>
-            <pc:docMk/>
-            <pc:sldMk cId="1871673063" sldId="309"/>
-            <ac:spMk id="2" creationId="{00000000-0000-0000-0000-000000000000}"/>
-          </ac:spMkLst>
-        </pc:spChg>
-      </pc:sldChg>
-      <pc:sldChg chg="modSp">
-        <pc:chgData name="Mutasa T R R T (FCES)" userId="S::30004825@students.southwales.ac.uk::e10a28fd-ae22-4d0d-acae-6a3382516f36" providerId="AD" clId="Web-{20F081F3-818F-0DDB-4C32-74C2A5D07321}" dt="2021-11-02T12:34:18.274" v="3" actId="20577"/>
-        <pc:sldMkLst>
-          <pc:docMk/>
-          <pc:sldMk cId="3066015917" sldId="325"/>
-        </pc:sldMkLst>
-        <pc:spChg chg="mod">
-          <ac:chgData name="Mutasa T R R T (FCES)" userId="S::30004825@students.southwales.ac.uk::e10a28fd-ae22-4d0d-acae-6a3382516f36" providerId="AD" clId="Web-{20F081F3-818F-0DDB-4C32-74C2A5D07321}" dt="2021-11-02T12:34:18.274" v="3" actId="20577"/>
-          <ac:spMkLst>
-            <pc:docMk/>
-            <pc:sldMk cId="3066015917" sldId="325"/>
-            <ac:spMk id="2" creationId="{00000000-0000-0000-0000-000000000000}"/>
-          </ac:spMkLst>
-        </pc:spChg>
-      </pc:sldChg>
-      <pc:sldChg chg="modSp">
-        <pc:chgData name="Mutasa T R R T (FCES)" userId="S::30004825@students.southwales.ac.uk::e10a28fd-ae22-4d0d-acae-6a3382516f36" providerId="AD" clId="Web-{20F081F3-818F-0DDB-4C32-74C2A5D07321}" dt="2021-11-02T12:33:49.945" v="1" actId="20577"/>
-        <pc:sldMkLst>
-          <pc:docMk/>
-          <pc:sldMk cId="1502871932" sldId="327"/>
-        </pc:sldMkLst>
-        <pc:spChg chg="mod">
-          <ac:chgData name="Mutasa T R R T (FCES)" userId="S::30004825@students.southwales.ac.uk::e10a28fd-ae22-4d0d-acae-6a3382516f36" providerId="AD" clId="Web-{20F081F3-818F-0DDB-4C32-74C2A5D07321}" dt="2021-11-02T12:33:49.945" v="1" actId="20577"/>
-          <ac:spMkLst>
-            <pc:docMk/>
-            <pc:sldMk cId="1502871932" sldId="327"/>
-            <ac:spMk id="3" creationId="{00000000-0000-0000-0000-000000000000}"/>
-          </ac:spMkLst>
-        </pc:spChg>
-      </pc:sldChg>
-      <pc:sldChg chg="modSp new">
-        <pc:chgData name="Mutasa T R R T (FCES)" userId="S::30004825@students.southwales.ac.uk::e10a28fd-ae22-4d0d-acae-6a3382516f36" providerId="AD" clId="Web-{20F081F3-818F-0DDB-4C32-74C2A5D07321}" dt="2021-11-02T12:39:09.281" v="82" actId="20577"/>
-        <pc:sldMkLst>
-          <pc:docMk/>
-          <pc:sldMk cId="270185241" sldId="329"/>
-        </pc:sldMkLst>
-        <pc:spChg chg="mod">
-          <ac:chgData name="Mutasa T R R T (FCES)" userId="S::30004825@students.southwales.ac.uk::e10a28fd-ae22-4d0d-acae-6a3382516f36" providerId="AD" clId="Web-{20F081F3-818F-0DDB-4C32-74C2A5D07321}" dt="2021-11-02T12:36:36.230" v="17" actId="20577"/>
-          <ac:spMkLst>
-            <pc:docMk/>
-            <pc:sldMk cId="270185241" sldId="329"/>
-            <ac:spMk id="2" creationId="{57FF02FF-A8C5-485C-94EB-3E1DAAFD110F}"/>
-          </ac:spMkLst>
-        </pc:spChg>
-        <pc:spChg chg="mod">
-          <ac:chgData name="Mutasa T R R T (FCES)" userId="S::30004825@students.southwales.ac.uk::e10a28fd-ae22-4d0d-acae-6a3382516f36" providerId="AD" clId="Web-{20F081F3-818F-0DDB-4C32-74C2A5D07321}" dt="2021-11-02T12:39:09.281" v="82" actId="20577"/>
-          <ac:spMkLst>
-            <pc:docMk/>
-            <pc:sldMk cId="270185241" sldId="329"/>
-            <ac:spMk id="3" creationId="{36735DBE-B554-4477-A0A8-F436D956AEA1}"/>
-          </ac:spMkLst>
-        </pc:spChg>
-      </pc:sldChg>
-      <pc:sldChg chg="new del">
-        <pc:chgData name="Mutasa T R R T (FCES)" userId="S::30004825@students.southwales.ac.uk::e10a28fd-ae22-4d0d-acae-6a3382516f36" providerId="AD" clId="Web-{20F081F3-818F-0DDB-4C32-74C2A5D07321}" dt="2021-11-02T12:39:58.267" v="83"/>
-        <pc:sldMkLst>
-          <pc:docMk/>
-          <pc:sldMk cId="3738298503" sldId="330"/>
         </pc:sldMkLst>
       </pc:sldChg>
     </pc:docChg>
@@ -609,7 +623,7 @@
           <a:p>
             <a:fld id="{DE9D3E5C-C40F-4E8F-8A30-4676B3E4C94E}" type="datetimeFigureOut">
               <a:rPr lang="en-GB" smtClean="0"/>
-              <a:t>03/11/2021</a:t>
+              <a:t>05/11/2021</a:t>
             </a:fld>
             <a:endParaRPr lang="en-GB" dirty="0"/>
           </a:p>
@@ -1142,7 +1156,7 @@
           <a:p>
             <a:fld id="{E1DAD913-3002-4015-9FB5-D2F7E836993F}" type="datetimeFigureOut">
               <a:rPr lang="en-GB" smtClean="0"/>
-              <a:t>03/11/2021</a:t>
+              <a:t>05/11/2021</a:t>
             </a:fld>
             <a:endParaRPr lang="en-GB" dirty="0"/>
           </a:p>
@@ -1312,7 +1326,7 @@
           <a:p>
             <a:fld id="{E1DAD913-3002-4015-9FB5-D2F7E836993F}" type="datetimeFigureOut">
               <a:rPr lang="en-GB" smtClean="0"/>
-              <a:t>03/11/2021</a:t>
+              <a:t>05/11/2021</a:t>
             </a:fld>
             <a:endParaRPr lang="en-GB" dirty="0"/>
           </a:p>
@@ -1492,7 +1506,7 @@
           <a:p>
             <a:fld id="{E1DAD913-3002-4015-9FB5-D2F7E836993F}" type="datetimeFigureOut">
               <a:rPr lang="en-GB" smtClean="0"/>
-              <a:t>03/11/2021</a:t>
+              <a:t>05/11/2021</a:t>
             </a:fld>
             <a:endParaRPr lang="en-GB" dirty="0"/>
           </a:p>
@@ -1610,7 +1624,7 @@
           <a:p>
             <a:fld id="{E1DAD913-3002-4015-9FB5-D2F7E836993F}" type="datetimeFigureOut">
               <a:rPr lang="en-GB" smtClean="0"/>
-              <a:t>03/11/2021</a:t>
+              <a:t>05/11/2021</a:t>
             </a:fld>
             <a:endParaRPr lang="en-GB" dirty="0"/>
           </a:p>
@@ -1780,7 +1794,7 @@
           <a:p>
             <a:fld id="{E1DAD913-3002-4015-9FB5-D2F7E836993F}" type="datetimeFigureOut">
               <a:rPr lang="en-GB" smtClean="0"/>
-              <a:t>03/11/2021</a:t>
+              <a:t>05/11/2021</a:t>
             </a:fld>
             <a:endParaRPr lang="en-GB" dirty="0"/>
           </a:p>
@@ -2062,7 +2076,7 @@
           <a:p>
             <a:fld id="{E1DAD913-3002-4015-9FB5-D2F7E836993F}" type="datetimeFigureOut">
               <a:rPr lang="en-GB" smtClean="0"/>
-              <a:t>03/11/2021</a:t>
+              <a:t>05/11/2021</a:t>
             </a:fld>
             <a:endParaRPr lang="en-GB" dirty="0"/>
           </a:p>
@@ -2350,7 +2364,7 @@
           <a:p>
             <a:fld id="{E1DAD913-3002-4015-9FB5-D2F7E836993F}" type="datetimeFigureOut">
               <a:rPr lang="en-GB" smtClean="0"/>
-              <a:t>03/11/2021</a:t>
+              <a:t>05/11/2021</a:t>
             </a:fld>
             <a:endParaRPr lang="en-GB" dirty="0"/>
           </a:p>
@@ -2772,7 +2786,7 @@
           <a:p>
             <a:fld id="{E1DAD913-3002-4015-9FB5-D2F7E836993F}" type="datetimeFigureOut">
               <a:rPr lang="en-GB" smtClean="0"/>
-              <a:t>03/11/2021</a:t>
+              <a:t>05/11/2021</a:t>
             </a:fld>
             <a:endParaRPr lang="en-GB" dirty="0"/>
           </a:p>
@@ -2890,7 +2904,7 @@
           <a:p>
             <a:fld id="{E1DAD913-3002-4015-9FB5-D2F7E836993F}" type="datetimeFigureOut">
               <a:rPr lang="en-GB" smtClean="0"/>
-              <a:t>03/11/2021</a:t>
+              <a:t>05/11/2021</a:t>
             </a:fld>
             <a:endParaRPr lang="en-GB" dirty="0"/>
           </a:p>
@@ -2985,7 +2999,7 @@
           <a:p>
             <a:fld id="{E1DAD913-3002-4015-9FB5-D2F7E836993F}" type="datetimeFigureOut">
               <a:rPr lang="en-GB" smtClean="0"/>
-              <a:t>03/11/2021</a:t>
+              <a:t>05/11/2021</a:t>
             </a:fld>
             <a:endParaRPr lang="en-GB" dirty="0"/>
           </a:p>
@@ -3262,7 +3276,7 @@
           <a:p>
             <a:fld id="{E1DAD913-3002-4015-9FB5-D2F7E836993F}" type="datetimeFigureOut">
               <a:rPr lang="en-GB" smtClean="0"/>
-              <a:t>03/11/2021</a:t>
+              <a:t>05/11/2021</a:t>
             </a:fld>
             <a:endParaRPr lang="en-GB" dirty="0"/>
           </a:p>
@@ -3515,7 +3529,7 @@
           <a:p>
             <a:fld id="{E1DAD913-3002-4015-9FB5-D2F7E836993F}" type="datetimeFigureOut">
               <a:rPr lang="en-GB" smtClean="0"/>
-              <a:t>03/11/2021</a:t>
+              <a:t>05/11/2021</a:t>
             </a:fld>
             <a:endParaRPr lang="en-GB" dirty="0"/>
           </a:p>
@@ -3728,7 +3742,7 @@
           <a:p>
             <a:fld id="{E1DAD913-3002-4015-9FB5-D2F7E836993F}" type="datetimeFigureOut">
               <a:rPr lang="en-GB" smtClean="0"/>
-              <a:t>03/11/2021</a:t>
+              <a:t>05/11/2021</a:t>
             </a:fld>
             <a:endParaRPr lang="en-GB" dirty="0"/>
           </a:p>
@@ -4577,15 +4591,8 @@
           <a:p>
             <a:r>
               <a:rPr lang="en-GB" dirty="0"/>
-              <a:t>Users must not allow third party to use their account to access the </a:t>
-            </a:r>
-            <a:r>
-              <a:rPr lang="en-GB"/>
-              <a:t>booking system</a:t>
-            </a:r>
-          </a:p>
-          <a:p>
-            <a:endParaRPr lang="en-GB" dirty="0"/>
+              <a:t>Users must not allow third party to use their account to access the booking system</a:t>
+            </a:r>
           </a:p>
         </p:txBody>
       </p:sp>
@@ -5215,10 +5222,15 @@
             <p:ph idx="1"/>
           </p:nvPr>
         </p:nvSpPr>
-        <p:spPr/>
+        <p:spPr>
+          <a:xfrm>
+            <a:off x="457200" y="1600200"/>
+            <a:ext cx="8229600" cy="5141168"/>
+          </a:xfrm>
+        </p:spPr>
         <p:txBody>
           <a:bodyPr vert="horz" lIns="91440" tIns="45720" rIns="91440" bIns="45720" rtlCol="0" anchor="t">
-            <a:normAutofit/>
+            <a:normAutofit fontScale="77500" lnSpcReduction="20000"/>
           </a:bodyPr>
           <a:lstStyle/>
           <a:p>
@@ -5226,7 +5238,7 @@
               <a:rPr lang="en-GB" dirty="0">
                 <a:cs typeface="Calibri"/>
               </a:rPr>
-              <a:t>What does the library have to do in order to be allowed to use our program? </a:t>
+              <a:t>The licensee must sign purchase agreement with Team Three before they can use the booking system</a:t>
             </a:r>
           </a:p>
           <a:p>
@@ -5234,7 +5246,47 @@
               <a:rPr lang="en-GB" dirty="0">
                 <a:cs typeface="Calibri"/>
               </a:rPr>
-              <a:t>Is it free? Is it subscription </a:t>
+              <a:t>The licensee and Team Three will agree to a monthly subscription payment for the use of the system</a:t>
+            </a:r>
+          </a:p>
+          <a:p>
+            <a:r>
+              <a:rPr lang="en-GB" dirty="0">
+                <a:cs typeface="Calibri"/>
+              </a:rPr>
+              <a:t>The license will terminate immediately if the licensee stop making the agreed payments</a:t>
+            </a:r>
+          </a:p>
+          <a:p>
+            <a:r>
+              <a:rPr lang="en-GB" dirty="0">
+                <a:cs typeface="Calibri"/>
+              </a:rPr>
+              <a:t>Licensee can only allow currently enrolled student and staffs to use the booking system</a:t>
+            </a:r>
+          </a:p>
+          <a:p>
+            <a:r>
+              <a:rPr lang="en-GB" dirty="0">
+                <a:cs typeface="Calibri"/>
+              </a:rPr>
+              <a:t>The library is not allowed to make the booking system available to third party not authorised in this agreement</a:t>
+            </a:r>
+          </a:p>
+          <a:p>
+            <a:r>
+              <a:rPr lang="en-GB" dirty="0">
+                <a:cs typeface="Calibri"/>
+              </a:rPr>
+              <a:t>Team three is and will remain the sole and exclusive owner of all rights</a:t>
+            </a:r>
+          </a:p>
+          <a:p>
+            <a:r>
+              <a:rPr lang="en-GB" dirty="0">
+                <a:cs typeface="Calibri"/>
+              </a:rPr>
+              <a:t>Upon termination of the agreement by Team Three, all licenses, rights and authorizations granted herein will immediately terminate</a:t>
             </a:r>
           </a:p>
           <a:p>

</xml_diff>